<commit_message>
Updated documentation to doxygen standard
</commit_message>
<xml_diff>
--- a/media/figure/TCS230 Functional Diagrams.pptx
+++ b/media/figure/TCS230 Functional Diagrams.pptx
@@ -104,6 +104,22 @@
       </a:defRPr>
     </a:lvl9pPr>
   </p:defaultTextStyle>
+  <p:extLst>
+    <p:ext uri="{EFAFB233-063F-42B5-8137-9DF3F51BA10A}">
+      <p15:sldGuideLst xmlns:p15="http://schemas.microsoft.com/office/powerpoint/2012/main">
+        <p15:guide id="1" orient="horz" pos="2160">
+          <p15:clr>
+            <a:srgbClr val="A4A3A4"/>
+          </p15:clr>
+        </p15:guide>
+        <p15:guide id="2" pos="2880">
+          <p15:clr>
+            <a:srgbClr val="A4A3A4"/>
+          </p15:clr>
+        </p15:guide>
+      </p15:sldGuideLst>
+    </p:ext>
+  </p:extLst>
 </p:presentation>
 </file>
 
@@ -145,7 +161,7 @@
           <a:lstStyle/>
           <a:p>
             <a:r>
-              <a:rPr lang="en-US" smtClean="0"/>
+              <a:rPr lang="en-US"/>
               <a:t>Click to edit Master title style</a:t>
             </a:r>
             <a:endParaRPr lang="en-AU"/>
@@ -264,7 +280,7 @@
           </a:lstStyle>
           <a:p>
             <a:r>
-              <a:rPr lang="en-US" smtClean="0"/>
+              <a:rPr lang="en-US"/>
               <a:t>Click to edit Master subtitle style</a:t>
             </a:r>
             <a:endParaRPr lang="en-AU"/>
@@ -288,7 +304,7 @@
           <a:p>
             <a:fld id="{23EE98EC-434B-4485-8071-B72996E1CC3F}" type="datetimeFigureOut">
               <a:rPr lang="en-AU" smtClean="0"/>
-              <a:t>24/11/2013</a:t>
+              <a:t>15/02/2018</a:t>
             </a:fld>
             <a:endParaRPr lang="en-AU"/>
           </a:p>
@@ -382,7 +398,7 @@
           <a:lstStyle/>
           <a:p>
             <a:r>
-              <a:rPr lang="en-US" smtClean="0"/>
+              <a:rPr lang="en-US"/>
               <a:t>Click to edit Master title style</a:t>
             </a:r>
             <a:endParaRPr lang="en-AU"/>
@@ -406,35 +422,35 @@
           <a:p>
             <a:pPr lvl="0"/>
             <a:r>
-              <a:rPr lang="en-US" smtClean="0"/>
+              <a:rPr lang="en-US"/>
               <a:t>Click to edit Master text styles</a:t>
             </a:r>
           </a:p>
           <a:p>
             <a:pPr lvl="1"/>
             <a:r>
-              <a:rPr lang="en-US" smtClean="0"/>
+              <a:rPr lang="en-US"/>
               <a:t>Second level</a:t>
             </a:r>
           </a:p>
           <a:p>
             <a:pPr lvl="2"/>
             <a:r>
-              <a:rPr lang="en-US" smtClean="0"/>
+              <a:rPr lang="en-US"/>
               <a:t>Third level</a:t>
             </a:r>
           </a:p>
           <a:p>
             <a:pPr lvl="3"/>
             <a:r>
-              <a:rPr lang="en-US" smtClean="0"/>
+              <a:rPr lang="en-US"/>
               <a:t>Fourth level</a:t>
             </a:r>
           </a:p>
           <a:p>
             <a:pPr lvl="4"/>
             <a:r>
-              <a:rPr lang="en-US" smtClean="0"/>
+              <a:rPr lang="en-US"/>
               <a:t>Fifth level</a:t>
             </a:r>
             <a:endParaRPr lang="en-AU"/>
@@ -458,7 +474,7 @@
           <a:p>
             <a:fld id="{23EE98EC-434B-4485-8071-B72996E1CC3F}" type="datetimeFigureOut">
               <a:rPr lang="en-AU" smtClean="0"/>
-              <a:t>24/11/2013</a:t>
+              <a:t>15/02/2018</a:t>
             </a:fld>
             <a:endParaRPr lang="en-AU"/>
           </a:p>
@@ -557,7 +573,7 @@
           <a:lstStyle/>
           <a:p>
             <a:r>
-              <a:rPr lang="en-US" smtClean="0"/>
+              <a:rPr lang="en-US"/>
               <a:t>Click to edit Master title style</a:t>
             </a:r>
             <a:endParaRPr lang="en-AU"/>
@@ -586,35 +602,35 @@
           <a:p>
             <a:pPr lvl="0"/>
             <a:r>
-              <a:rPr lang="en-US" smtClean="0"/>
+              <a:rPr lang="en-US"/>
               <a:t>Click to edit Master text styles</a:t>
             </a:r>
           </a:p>
           <a:p>
             <a:pPr lvl="1"/>
             <a:r>
-              <a:rPr lang="en-US" smtClean="0"/>
+              <a:rPr lang="en-US"/>
               <a:t>Second level</a:t>
             </a:r>
           </a:p>
           <a:p>
             <a:pPr lvl="2"/>
             <a:r>
-              <a:rPr lang="en-US" smtClean="0"/>
+              <a:rPr lang="en-US"/>
               <a:t>Third level</a:t>
             </a:r>
           </a:p>
           <a:p>
             <a:pPr lvl="3"/>
             <a:r>
-              <a:rPr lang="en-US" smtClean="0"/>
+              <a:rPr lang="en-US"/>
               <a:t>Fourth level</a:t>
             </a:r>
           </a:p>
           <a:p>
             <a:pPr lvl="4"/>
             <a:r>
-              <a:rPr lang="en-US" smtClean="0"/>
+              <a:rPr lang="en-US"/>
               <a:t>Fifth level</a:t>
             </a:r>
             <a:endParaRPr lang="en-AU"/>
@@ -638,7 +654,7 @@
           <a:p>
             <a:fld id="{23EE98EC-434B-4485-8071-B72996E1CC3F}" type="datetimeFigureOut">
               <a:rPr lang="en-AU" smtClean="0"/>
-              <a:t>24/11/2013</a:t>
+              <a:t>15/02/2018</a:t>
             </a:fld>
             <a:endParaRPr lang="en-AU"/>
           </a:p>
@@ -732,7 +748,7 @@
           <a:lstStyle/>
           <a:p>
             <a:r>
-              <a:rPr lang="en-US" smtClean="0"/>
+              <a:rPr lang="en-US"/>
               <a:t>Click to edit Master title style</a:t>
             </a:r>
             <a:endParaRPr lang="en-AU"/>
@@ -756,35 +772,35 @@
           <a:p>
             <a:pPr lvl="0"/>
             <a:r>
-              <a:rPr lang="en-US" smtClean="0"/>
+              <a:rPr lang="en-US"/>
               <a:t>Click to edit Master text styles</a:t>
             </a:r>
           </a:p>
           <a:p>
             <a:pPr lvl="1"/>
             <a:r>
-              <a:rPr lang="en-US" smtClean="0"/>
+              <a:rPr lang="en-US"/>
               <a:t>Second level</a:t>
             </a:r>
           </a:p>
           <a:p>
             <a:pPr lvl="2"/>
             <a:r>
-              <a:rPr lang="en-US" smtClean="0"/>
+              <a:rPr lang="en-US"/>
               <a:t>Third level</a:t>
             </a:r>
           </a:p>
           <a:p>
             <a:pPr lvl="3"/>
             <a:r>
-              <a:rPr lang="en-US" smtClean="0"/>
+              <a:rPr lang="en-US"/>
               <a:t>Fourth level</a:t>
             </a:r>
           </a:p>
           <a:p>
             <a:pPr lvl="4"/>
             <a:r>
-              <a:rPr lang="en-US" smtClean="0"/>
+              <a:rPr lang="en-US"/>
               <a:t>Fifth level</a:t>
             </a:r>
             <a:endParaRPr lang="en-AU"/>
@@ -808,7 +824,7 @@
           <a:p>
             <a:fld id="{23EE98EC-434B-4485-8071-B72996E1CC3F}" type="datetimeFigureOut">
               <a:rPr lang="en-AU" smtClean="0"/>
-              <a:t>24/11/2013</a:t>
+              <a:t>15/02/2018</a:t>
             </a:fld>
             <a:endParaRPr lang="en-AU"/>
           </a:p>
@@ -911,7 +927,7 @@
           </a:lstStyle>
           <a:p>
             <a:r>
-              <a:rPr lang="en-US" smtClean="0"/>
+              <a:rPr lang="en-US"/>
               <a:t>Click to edit Master title style</a:t>
             </a:r>
             <a:endParaRPr lang="en-AU"/>
@@ -1031,7 +1047,7 @@
           <a:p>
             <a:pPr lvl="0"/>
             <a:r>
-              <a:rPr lang="en-US" smtClean="0"/>
+              <a:rPr lang="en-US"/>
               <a:t>Click to edit Master text styles</a:t>
             </a:r>
           </a:p>
@@ -1054,7 +1070,7 @@
           <a:p>
             <a:fld id="{23EE98EC-434B-4485-8071-B72996E1CC3F}" type="datetimeFigureOut">
               <a:rPr lang="en-AU" smtClean="0"/>
-              <a:t>24/11/2013</a:t>
+              <a:t>15/02/2018</a:t>
             </a:fld>
             <a:endParaRPr lang="en-AU"/>
           </a:p>
@@ -1148,7 +1164,7 @@
           <a:lstStyle/>
           <a:p>
             <a:r>
-              <a:rPr lang="en-US" smtClean="0"/>
+              <a:rPr lang="en-US"/>
               <a:t>Click to edit Master title style</a:t>
             </a:r>
             <a:endParaRPr lang="en-AU"/>
@@ -1205,35 +1221,35 @@
           <a:p>
             <a:pPr lvl="0"/>
             <a:r>
-              <a:rPr lang="en-US" smtClean="0"/>
+              <a:rPr lang="en-US"/>
               <a:t>Click to edit Master text styles</a:t>
             </a:r>
           </a:p>
           <a:p>
             <a:pPr lvl="1"/>
             <a:r>
-              <a:rPr lang="en-US" smtClean="0"/>
+              <a:rPr lang="en-US"/>
               <a:t>Second level</a:t>
             </a:r>
           </a:p>
           <a:p>
             <a:pPr lvl="2"/>
             <a:r>
-              <a:rPr lang="en-US" smtClean="0"/>
+              <a:rPr lang="en-US"/>
               <a:t>Third level</a:t>
             </a:r>
           </a:p>
           <a:p>
             <a:pPr lvl="3"/>
             <a:r>
-              <a:rPr lang="en-US" smtClean="0"/>
+              <a:rPr lang="en-US"/>
               <a:t>Fourth level</a:t>
             </a:r>
           </a:p>
           <a:p>
             <a:pPr lvl="4"/>
             <a:r>
-              <a:rPr lang="en-US" smtClean="0"/>
+              <a:rPr lang="en-US"/>
               <a:t>Fifth level</a:t>
             </a:r>
             <a:endParaRPr lang="en-AU"/>
@@ -1290,35 +1306,35 @@
           <a:p>
             <a:pPr lvl="0"/>
             <a:r>
-              <a:rPr lang="en-US" smtClean="0"/>
+              <a:rPr lang="en-US"/>
               <a:t>Click to edit Master text styles</a:t>
             </a:r>
           </a:p>
           <a:p>
             <a:pPr lvl="1"/>
             <a:r>
-              <a:rPr lang="en-US" smtClean="0"/>
+              <a:rPr lang="en-US"/>
               <a:t>Second level</a:t>
             </a:r>
           </a:p>
           <a:p>
             <a:pPr lvl="2"/>
             <a:r>
-              <a:rPr lang="en-US" smtClean="0"/>
+              <a:rPr lang="en-US"/>
               <a:t>Third level</a:t>
             </a:r>
           </a:p>
           <a:p>
             <a:pPr lvl="3"/>
             <a:r>
-              <a:rPr lang="en-US" smtClean="0"/>
+              <a:rPr lang="en-US"/>
               <a:t>Fourth level</a:t>
             </a:r>
           </a:p>
           <a:p>
             <a:pPr lvl="4"/>
             <a:r>
-              <a:rPr lang="en-US" smtClean="0"/>
+              <a:rPr lang="en-US"/>
               <a:t>Fifth level</a:t>
             </a:r>
             <a:endParaRPr lang="en-AU"/>
@@ -1342,7 +1358,7 @@
           <a:p>
             <a:fld id="{23EE98EC-434B-4485-8071-B72996E1CC3F}" type="datetimeFigureOut">
               <a:rPr lang="en-AU" smtClean="0"/>
-              <a:t>24/11/2013</a:t>
+              <a:t>15/02/2018</a:t>
             </a:fld>
             <a:endParaRPr lang="en-AU"/>
           </a:p>
@@ -1440,7 +1456,7 @@
           </a:lstStyle>
           <a:p>
             <a:r>
-              <a:rPr lang="en-US" smtClean="0"/>
+              <a:rPr lang="en-US"/>
               <a:t>Click to edit Master title style</a:t>
             </a:r>
             <a:endParaRPr lang="en-AU"/>
@@ -1506,7 +1522,7 @@
           <a:p>
             <a:pPr lvl="0"/>
             <a:r>
-              <a:rPr lang="en-US" smtClean="0"/>
+              <a:rPr lang="en-US"/>
               <a:t>Click to edit Master text styles</a:t>
             </a:r>
           </a:p>
@@ -1562,35 +1578,35 @@
           <a:p>
             <a:pPr lvl="0"/>
             <a:r>
-              <a:rPr lang="en-US" smtClean="0"/>
+              <a:rPr lang="en-US"/>
               <a:t>Click to edit Master text styles</a:t>
             </a:r>
           </a:p>
           <a:p>
             <a:pPr lvl="1"/>
             <a:r>
-              <a:rPr lang="en-US" smtClean="0"/>
+              <a:rPr lang="en-US"/>
               <a:t>Second level</a:t>
             </a:r>
           </a:p>
           <a:p>
             <a:pPr lvl="2"/>
             <a:r>
-              <a:rPr lang="en-US" smtClean="0"/>
+              <a:rPr lang="en-US"/>
               <a:t>Third level</a:t>
             </a:r>
           </a:p>
           <a:p>
             <a:pPr lvl="3"/>
             <a:r>
-              <a:rPr lang="en-US" smtClean="0"/>
+              <a:rPr lang="en-US"/>
               <a:t>Fourth level</a:t>
             </a:r>
           </a:p>
           <a:p>
             <a:pPr lvl="4"/>
             <a:r>
-              <a:rPr lang="en-US" smtClean="0"/>
+              <a:rPr lang="en-US"/>
               <a:t>Fifth level</a:t>
             </a:r>
             <a:endParaRPr lang="en-AU"/>
@@ -1656,7 +1672,7 @@
           <a:p>
             <a:pPr lvl="0"/>
             <a:r>
-              <a:rPr lang="en-US" smtClean="0"/>
+              <a:rPr lang="en-US"/>
               <a:t>Click to edit Master text styles</a:t>
             </a:r>
           </a:p>
@@ -1712,35 +1728,35 @@
           <a:p>
             <a:pPr lvl="0"/>
             <a:r>
-              <a:rPr lang="en-US" smtClean="0"/>
+              <a:rPr lang="en-US"/>
               <a:t>Click to edit Master text styles</a:t>
             </a:r>
           </a:p>
           <a:p>
             <a:pPr lvl="1"/>
             <a:r>
-              <a:rPr lang="en-US" smtClean="0"/>
+              <a:rPr lang="en-US"/>
               <a:t>Second level</a:t>
             </a:r>
           </a:p>
           <a:p>
             <a:pPr lvl="2"/>
             <a:r>
-              <a:rPr lang="en-US" smtClean="0"/>
+              <a:rPr lang="en-US"/>
               <a:t>Third level</a:t>
             </a:r>
           </a:p>
           <a:p>
             <a:pPr lvl="3"/>
             <a:r>
-              <a:rPr lang="en-US" smtClean="0"/>
+              <a:rPr lang="en-US"/>
               <a:t>Fourth level</a:t>
             </a:r>
           </a:p>
           <a:p>
             <a:pPr lvl="4"/>
             <a:r>
-              <a:rPr lang="en-US" smtClean="0"/>
+              <a:rPr lang="en-US"/>
               <a:t>Fifth level</a:t>
             </a:r>
             <a:endParaRPr lang="en-AU"/>
@@ -1764,7 +1780,7 @@
           <a:p>
             <a:fld id="{23EE98EC-434B-4485-8071-B72996E1CC3F}" type="datetimeFigureOut">
               <a:rPr lang="en-AU" smtClean="0"/>
-              <a:t>24/11/2013</a:t>
+              <a:t>15/02/2018</a:t>
             </a:fld>
             <a:endParaRPr lang="en-AU"/>
           </a:p>
@@ -1858,7 +1874,7 @@
           <a:lstStyle/>
           <a:p>
             <a:r>
-              <a:rPr lang="en-US" smtClean="0"/>
+              <a:rPr lang="en-US"/>
               <a:t>Click to edit Master title style</a:t>
             </a:r>
             <a:endParaRPr lang="en-AU"/>
@@ -1882,7 +1898,7 @@
           <a:p>
             <a:fld id="{23EE98EC-434B-4485-8071-B72996E1CC3F}" type="datetimeFigureOut">
               <a:rPr lang="en-AU" smtClean="0"/>
-              <a:t>24/11/2013</a:t>
+              <a:t>15/02/2018</a:t>
             </a:fld>
             <a:endParaRPr lang="en-AU"/>
           </a:p>
@@ -1977,7 +1993,7 @@
           <a:p>
             <a:fld id="{23EE98EC-434B-4485-8071-B72996E1CC3F}" type="datetimeFigureOut">
               <a:rPr lang="en-AU" smtClean="0"/>
-              <a:t>24/11/2013</a:t>
+              <a:t>15/02/2018</a:t>
             </a:fld>
             <a:endParaRPr lang="en-AU"/>
           </a:p>
@@ -2080,7 +2096,7 @@
           </a:lstStyle>
           <a:p>
             <a:r>
-              <a:rPr lang="en-US" smtClean="0"/>
+              <a:rPr lang="en-US"/>
               <a:t>Click to edit Master title style</a:t>
             </a:r>
             <a:endParaRPr lang="en-AU"/>
@@ -2137,35 +2153,35 @@
           <a:p>
             <a:pPr lvl="0"/>
             <a:r>
-              <a:rPr lang="en-US" smtClean="0"/>
+              <a:rPr lang="en-US"/>
               <a:t>Click to edit Master text styles</a:t>
             </a:r>
           </a:p>
           <a:p>
             <a:pPr lvl="1"/>
             <a:r>
-              <a:rPr lang="en-US" smtClean="0"/>
+              <a:rPr lang="en-US"/>
               <a:t>Second level</a:t>
             </a:r>
           </a:p>
           <a:p>
             <a:pPr lvl="2"/>
             <a:r>
-              <a:rPr lang="en-US" smtClean="0"/>
+              <a:rPr lang="en-US"/>
               <a:t>Third level</a:t>
             </a:r>
           </a:p>
           <a:p>
             <a:pPr lvl="3"/>
             <a:r>
-              <a:rPr lang="en-US" smtClean="0"/>
+              <a:rPr lang="en-US"/>
               <a:t>Fourth level</a:t>
             </a:r>
           </a:p>
           <a:p>
             <a:pPr lvl="4"/>
             <a:r>
-              <a:rPr lang="en-US" smtClean="0"/>
+              <a:rPr lang="en-US"/>
               <a:t>Fifth level</a:t>
             </a:r>
             <a:endParaRPr lang="en-AU"/>
@@ -2231,7 +2247,7 @@
           <a:p>
             <a:pPr lvl="0"/>
             <a:r>
-              <a:rPr lang="en-US" smtClean="0"/>
+              <a:rPr lang="en-US"/>
               <a:t>Click to edit Master text styles</a:t>
             </a:r>
           </a:p>
@@ -2254,7 +2270,7 @@
           <a:p>
             <a:fld id="{23EE98EC-434B-4485-8071-B72996E1CC3F}" type="datetimeFigureOut">
               <a:rPr lang="en-AU" smtClean="0"/>
-              <a:t>24/11/2013</a:t>
+              <a:t>15/02/2018</a:t>
             </a:fld>
             <a:endParaRPr lang="en-AU"/>
           </a:p>
@@ -2357,7 +2373,7 @@
           </a:lstStyle>
           <a:p>
             <a:r>
-              <a:rPr lang="en-US" smtClean="0"/>
+              <a:rPr lang="en-US"/>
               <a:t>Click to edit Master title style</a:t>
             </a:r>
             <a:endParaRPr lang="en-AU"/>
@@ -2484,7 +2500,7 @@
           <a:p>
             <a:pPr lvl="0"/>
             <a:r>
-              <a:rPr lang="en-US" smtClean="0"/>
+              <a:rPr lang="en-US"/>
               <a:t>Click to edit Master text styles</a:t>
             </a:r>
           </a:p>
@@ -2507,7 +2523,7 @@
           <a:p>
             <a:fld id="{23EE98EC-434B-4485-8071-B72996E1CC3F}" type="datetimeFigureOut">
               <a:rPr lang="en-AU" smtClean="0"/>
-              <a:t>24/11/2013</a:t>
+              <a:t>15/02/2018</a:t>
             </a:fld>
             <a:endParaRPr lang="en-AU"/>
           </a:p>
@@ -2616,7 +2632,7 @@
           <a:lstStyle/>
           <a:p>
             <a:r>
-              <a:rPr lang="en-US" smtClean="0"/>
+              <a:rPr lang="en-US"/>
               <a:t>Click to edit Master title style</a:t>
             </a:r>
             <a:endParaRPr lang="en-AU"/>
@@ -2650,35 +2666,35 @@
           <a:p>
             <a:pPr lvl="0"/>
             <a:r>
-              <a:rPr lang="en-US" smtClean="0"/>
+              <a:rPr lang="en-US"/>
               <a:t>Click to edit Master text styles</a:t>
             </a:r>
           </a:p>
           <a:p>
             <a:pPr lvl="1"/>
             <a:r>
-              <a:rPr lang="en-US" smtClean="0"/>
+              <a:rPr lang="en-US"/>
               <a:t>Second level</a:t>
             </a:r>
           </a:p>
           <a:p>
             <a:pPr lvl="2"/>
             <a:r>
-              <a:rPr lang="en-US" smtClean="0"/>
+              <a:rPr lang="en-US"/>
               <a:t>Third level</a:t>
             </a:r>
           </a:p>
           <a:p>
             <a:pPr lvl="3"/>
             <a:r>
-              <a:rPr lang="en-US" smtClean="0"/>
+              <a:rPr lang="en-US"/>
               <a:t>Fourth level</a:t>
             </a:r>
           </a:p>
           <a:p>
             <a:pPr lvl="4"/>
             <a:r>
-              <a:rPr lang="en-US" smtClean="0"/>
+              <a:rPr lang="en-US"/>
               <a:t>Fifth level</a:t>
             </a:r>
             <a:endParaRPr lang="en-AU"/>
@@ -2720,7 +2736,7 @@
           <a:p>
             <a:fld id="{23EE98EC-434B-4485-8071-B72996E1CC3F}" type="datetimeFigureOut">
               <a:rPr lang="en-AU" smtClean="0"/>
-              <a:t>24/11/2013</a:t>
+              <a:t>15/02/2018</a:t>
             </a:fld>
             <a:endParaRPr lang="en-AU"/>
           </a:p>
@@ -3103,7 +3119,7 @@
         </p:nvGrpSpPr>
         <p:grpSpPr>
           <a:xfrm>
-            <a:off x="1180699" y="2081753"/>
+            <a:off x="1547664" y="764704"/>
             <a:ext cx="5155912" cy="1675349"/>
             <a:chOff x="1180699" y="2081753"/>
             <a:chExt cx="5155912" cy="1675349"/>
@@ -3152,18 +3168,13 @@
             <a:p>
               <a:pPr algn="ctr"/>
               <a:r>
-                <a:rPr lang="en-AU" sz="1000" dirty="0" smtClean="0">
+                <a:rPr lang="en-AU" sz="1000" dirty="0">
                   <a:solidFill>
                     <a:schemeClr val="tx1"/>
                   </a:solidFill>
                 </a:rPr>
                 <a:t>Photodiode Array</a:t>
               </a:r>
-              <a:endParaRPr lang="en-AU" sz="1000" dirty="0">
-                <a:solidFill>
-                  <a:schemeClr val="tx1"/>
-                </a:solidFill>
-              </a:endParaRPr>
             </a:p>
           </p:txBody>
         </p:sp>
@@ -3210,18 +3221,13 @@
             <a:p>
               <a:pPr algn="ctr"/>
               <a:r>
-                <a:rPr lang="en-AU" sz="1000" dirty="0" smtClean="0">
+                <a:rPr lang="en-AU" sz="1000" dirty="0">
                   <a:solidFill>
                     <a:schemeClr val="tx1"/>
                   </a:solidFill>
                 </a:rPr>
                 <a:t>Current-to-Frequency Converter</a:t>
               </a:r>
-              <a:endParaRPr lang="en-AU" sz="1000" dirty="0">
-                <a:solidFill>
-                  <a:schemeClr val="tx1"/>
-                </a:solidFill>
-              </a:endParaRPr>
             </a:p>
           </p:txBody>
         </p:sp>
@@ -3405,10 +3411,9 @@
             <a:lstStyle/>
             <a:p>
               <a:r>
-                <a:rPr lang="en-AU" sz="1000" dirty="0" smtClean="0"/>
+                <a:rPr lang="en-AU" sz="1000" dirty="0"/>
                 <a:t>Light</a:t>
               </a:r>
-              <a:endParaRPr lang="en-AU" sz="1000" dirty="0"/>
             </a:p>
           </p:txBody>
         </p:sp>
@@ -3436,14 +3441,13 @@
             <a:p>
               <a:pPr algn="ctr"/>
               <a:r>
-                <a:rPr lang="en-AU" sz="1000" dirty="0" err="1" smtClean="0"/>
+                <a:rPr lang="en-AU" sz="1000" dirty="0" err="1"/>
                 <a:t>Color</a:t>
               </a:r>
               <a:r>
-                <a:rPr lang="en-AU" sz="1000" dirty="0" smtClean="0"/>
+                <a:rPr lang="en-AU" sz="1000" dirty="0"/>
                 <a:t> Filter Selection</a:t>
               </a:r>
-              <a:endParaRPr lang="en-AU" sz="1000" dirty="0"/>
             </a:p>
           </p:txBody>
         </p:sp>
@@ -3471,10 +3475,9 @@
             <a:p>
               <a:pPr algn="ctr"/>
               <a:r>
-                <a:rPr lang="en-AU" sz="1000" dirty="0" smtClean="0"/>
+                <a:rPr lang="en-AU" sz="1000" dirty="0"/>
                 <a:t>Frequency Scale Selection</a:t>
               </a:r>
-              <a:endParaRPr lang="en-AU" sz="1000" dirty="0"/>
             </a:p>
           </p:txBody>
         </p:sp>
@@ -3642,10 +3645,9 @@
             <a:p>
               <a:pPr algn="ctr"/>
               <a:r>
-                <a:rPr lang="en-AU" sz="1000" dirty="0" smtClean="0"/>
-                <a:t>S0</a:t>
+                <a:rPr lang="en-AU" sz="1000" dirty="0"/>
+                <a:t>S2</a:t>
               </a:r>
-              <a:endParaRPr lang="en-AU" sz="1000" dirty="0"/>
             </a:p>
           </p:txBody>
         </p:sp>
@@ -3673,10 +3675,9 @@
             <a:p>
               <a:pPr algn="ctr"/>
               <a:r>
-                <a:rPr lang="en-AU" sz="1000" dirty="0" smtClean="0"/>
-                <a:t>S1</a:t>
+                <a:rPr lang="en-AU" sz="1000" dirty="0"/>
+                <a:t>S3</a:t>
               </a:r>
-              <a:endParaRPr lang="en-AU" sz="1000" dirty="0"/>
             </a:p>
           </p:txBody>
         </p:sp>
@@ -3704,10 +3705,9 @@
             <a:p>
               <a:pPr algn="ctr"/>
               <a:r>
-                <a:rPr lang="en-AU" sz="1000" dirty="0" smtClean="0"/>
-                <a:t>S2</a:t>
+                <a:rPr lang="en-AU" sz="1000" dirty="0"/>
+                <a:t>S0</a:t>
               </a:r>
-              <a:endParaRPr lang="en-AU" sz="1000" dirty="0"/>
             </a:p>
           </p:txBody>
         </p:sp>
@@ -3735,10 +3735,9 @@
             <a:p>
               <a:pPr algn="ctr"/>
               <a:r>
-                <a:rPr lang="en-AU" sz="1000" dirty="0" smtClean="0"/>
-                <a:t>S3</a:t>
+                <a:rPr lang="en-AU" sz="1000" dirty="0"/>
+                <a:t>S1</a:t>
               </a:r>
-              <a:endParaRPr lang="en-AU" sz="1000" dirty="0"/>
             </a:p>
           </p:txBody>
         </p:sp>
@@ -3871,10 +3870,9 @@
             <a:p>
               <a:pPr algn="ctr"/>
               <a:r>
-                <a:rPr lang="en-AU" sz="1000" dirty="0" smtClean="0"/>
+                <a:rPr lang="en-AU" sz="1000" dirty="0"/>
                 <a:t>OE</a:t>
               </a:r>
-              <a:endParaRPr lang="en-AU" sz="1000" dirty="0"/>
             </a:p>
           </p:txBody>
         </p:sp>
@@ -3936,10 +3934,9 @@
             <a:lstStyle/>
             <a:p>
               <a:r>
-                <a:rPr lang="en-AU" sz="1000" dirty="0" smtClean="0"/>
+                <a:rPr lang="en-AU" sz="1000" dirty="0"/>
                 <a:t>Output</a:t>
               </a:r>
-              <a:endParaRPr lang="en-AU" sz="1000" dirty="0"/>
             </a:p>
           </p:txBody>
         </p:sp>
@@ -4259,6 +4256,689 @@
           </p:style>
         </p:cxnSp>
       </p:grpSp>
+      <mc:AlternateContent xmlns:mc="http://schemas.openxmlformats.org/markup-compatibility/2006">
+        <mc:Choice xmlns:a14="http://schemas.microsoft.com/office/drawing/2010/main" Requires="a14">
+          <p:sp>
+            <p:nvSpPr>
+              <p:cNvPr id="2" name="Rectangle 1">
+                <a:extLst>
+                  <a:ext uri="{FF2B5EF4-FFF2-40B4-BE49-F238E27FC236}">
+                    <a16:creationId xmlns:a16="http://schemas.microsoft.com/office/drawing/2014/main" id="{E69ACE63-6EB9-4A95-A746-B27D0F3754E3}"/>
+                  </a:ext>
+                </a:extLst>
+              </p:cNvPr>
+              <p:cNvSpPr/>
+              <p:nvPr/>
+            </p:nvSpPr>
+            <p:spPr>
+              <a:xfrm>
+                <a:off x="3484875" y="3244334"/>
+                <a:ext cx="2174250" cy="369332"/>
+              </a:xfrm>
+              <a:prstGeom prst="rect">
+                <a:avLst/>
+              </a:prstGeom>
+            </p:spPr>
+            <p:txBody>
+              <a:bodyPr wrap="none">
+                <a:spAutoFit/>
+              </a:bodyPr>
+              <a:lstStyle/>
+              <a:p>
+                <a14:m>
+                  <m:oMathPara xmlns:m="http://schemas.openxmlformats.org/officeDocument/2006/math">
+                    <m:oMathParaPr>
+                      <m:jc m:val="centerGroup"/>
+                    </m:oMathParaPr>
+                    <m:oMath xmlns:m="http://schemas.openxmlformats.org/officeDocument/2006/math">
+                      <m:d>
+                        <m:dPr>
+                          <m:begChr m:val=""/>
+                          <m:ctrlPr>
+                            <a:rPr lang="en-AU">
+                              <a:latin typeface="Cambria Math" panose="02040503050406030204" pitchFamily="18" charset="0"/>
+                            </a:rPr>
+                          </m:ctrlPr>
+                        </m:dPr>
+                        <m:e>
+                          <m:sSub>
+                            <m:sSubPr>
+                              <m:ctrlPr>
+                                <a:rPr lang="en-AU">
+                                  <a:latin typeface="Cambria Math" panose="02040503050406030204" pitchFamily="18" charset="0"/>
+                                </a:rPr>
+                              </m:ctrlPr>
+                            </m:sSubPr>
+                            <m:e>
+                              <m:r>
+                                <a:rPr lang="en-AU" i="1">
+                                  <a:latin typeface="Cambria Math" panose="02040503050406030204" pitchFamily="18" charset="0"/>
+                                </a:rPr>
+                                <m:t>𝑓</m:t>
+                              </m:r>
+                            </m:e>
+                            <m:sub>
+                              <m:r>
+                                <a:rPr lang="en-AU" i="1">
+                                  <a:latin typeface="Cambria Math" panose="02040503050406030204" pitchFamily="18" charset="0"/>
+                                </a:rPr>
+                                <m:t>𝑂</m:t>
+                              </m:r>
+                            </m:sub>
+                          </m:sSub>
+                          <m:r>
+                            <a:rPr lang="en-AU" i="0">
+                              <a:latin typeface="Cambria Math" panose="02040503050406030204" pitchFamily="18" charset="0"/>
+                            </a:rPr>
+                            <m:t>=</m:t>
+                          </m:r>
+                          <m:sSub>
+                            <m:sSubPr>
+                              <m:ctrlPr>
+                                <a:rPr lang="en-AU" i="1">
+                                  <a:latin typeface="Cambria Math" panose="02040503050406030204" pitchFamily="18" charset="0"/>
+                                </a:rPr>
+                              </m:ctrlPr>
+                            </m:sSubPr>
+                            <m:e>
+                              <m:r>
+                                <a:rPr lang="en-AU" i="1">
+                                  <a:latin typeface="Cambria Math" panose="02040503050406030204" pitchFamily="18" charset="0"/>
+                                </a:rPr>
+                                <m:t>𝑓</m:t>
+                              </m:r>
+                            </m:e>
+                            <m:sub>
+                              <m:r>
+                                <a:rPr lang="en-AU" i="1">
+                                  <a:latin typeface="Cambria Math" panose="02040503050406030204" pitchFamily="18" charset="0"/>
+                                </a:rPr>
+                                <m:t>𝐷</m:t>
+                              </m:r>
+                            </m:sub>
+                          </m:sSub>
+                          <m:r>
+                            <a:rPr lang="en-AU" i="0">
+                              <a:latin typeface="Cambria Math" panose="02040503050406030204" pitchFamily="18" charset="0"/>
+                            </a:rPr>
+                            <m:t>+(</m:t>
+                          </m:r>
+                          <m:r>
+                            <a:rPr lang="en-AU" i="1">
+                              <a:latin typeface="Cambria Math" panose="02040503050406030204" pitchFamily="18" charset="0"/>
+                            </a:rPr>
+                            <m:t>𝑅𝑒</m:t>
+                          </m:r>
+                          <m:r>
+                            <a:rPr lang="en-AU" i="0">
+                              <a:latin typeface="Cambria Math" panose="02040503050406030204" pitchFamily="18" charset="0"/>
+                            </a:rPr>
+                            <m:t>)(</m:t>
+                          </m:r>
+                          <m:r>
+                            <a:rPr lang="en-AU" i="1">
+                              <a:latin typeface="Cambria Math" panose="02040503050406030204" pitchFamily="18" charset="0"/>
+                            </a:rPr>
+                            <m:t>𝐸𝑒</m:t>
+                          </m:r>
+                        </m:e>
+                      </m:d>
+                    </m:oMath>
+                  </m:oMathPara>
+                </a14:m>
+                <a:endParaRPr lang="en-AU" dirty="0"/>
+              </a:p>
+            </p:txBody>
+          </p:sp>
+        </mc:Choice>
+        <mc:Fallback>
+          <p:sp>
+            <p:nvSpPr>
+              <p:cNvPr id="2" name="Rectangle 1">
+                <a:extLst>
+                  <a:ext uri="{FF2B5EF4-FFF2-40B4-BE49-F238E27FC236}">
+                    <a16:creationId xmlns:a16="http://schemas.microsoft.com/office/drawing/2014/main" id="{E69ACE63-6EB9-4A95-A746-B27D0F3754E3}"/>
+                  </a:ext>
+                </a:extLst>
+              </p:cNvPr>
+              <p:cNvSpPr>
+                <a:spLocks noRot="1" noChangeAspect="1" noMove="1" noResize="1" noEditPoints="1" noAdjustHandles="1" noChangeArrowheads="1" noChangeShapeType="1" noTextEdit="1"/>
+              </p:cNvSpPr>
+              <p:nvPr/>
+            </p:nvSpPr>
+            <p:spPr>
+              <a:xfrm>
+                <a:off x="3484875" y="3244334"/>
+                <a:ext cx="2174250" cy="369332"/>
+              </a:xfrm>
+              <a:prstGeom prst="rect">
+                <a:avLst/>
+              </a:prstGeom>
+              <a:blipFill>
+                <a:blip r:embed="rId2"/>
+                <a:stretch>
+                  <a:fillRect t="-119672" r="-23315" b="-183607"/>
+                </a:stretch>
+              </a:blipFill>
+            </p:spPr>
+            <p:txBody>
+              <a:bodyPr/>
+              <a:lstStyle/>
+              <a:p>
+                <a:r>
+                  <a:rPr lang="en-AU">
+                    <a:noFill/>
+                  </a:rPr>
+                  <a:t> </a:t>
+                </a:r>
+              </a:p>
+            </p:txBody>
+          </p:sp>
+        </mc:Fallback>
+      </mc:AlternateContent>
+      <mc:AlternateContent xmlns:mc="http://schemas.openxmlformats.org/markup-compatibility/2006">
+        <mc:Choice xmlns:a14="http://schemas.microsoft.com/office/drawing/2010/main" Requires="a14">
+          <p:sp>
+            <p:nvSpPr>
+              <p:cNvPr id="3" name="Rectangle 2">
+                <a:extLst>
+                  <a:ext uri="{FF2B5EF4-FFF2-40B4-BE49-F238E27FC236}">
+                    <a16:creationId xmlns:a16="http://schemas.microsoft.com/office/drawing/2014/main" id="{54DF14C8-4B70-4E5C-8368-F0BEF2C15755}"/>
+                  </a:ext>
+                </a:extLst>
+              </p:cNvPr>
+              <p:cNvSpPr/>
+              <p:nvPr/>
+            </p:nvSpPr>
+            <p:spPr>
+              <a:xfrm>
+                <a:off x="3246777" y="3871502"/>
+                <a:ext cx="2725040" cy="629916"/>
+              </a:xfrm>
+              <a:prstGeom prst="rect">
+                <a:avLst/>
+              </a:prstGeom>
+            </p:spPr>
+            <p:txBody>
+              <a:bodyPr wrap="none">
+                <a:spAutoFit/>
+              </a:bodyPr>
+              <a:lstStyle/>
+              <a:p>
+                <a14:m>
+                  <m:oMathPara xmlns:m="http://schemas.openxmlformats.org/officeDocument/2006/math">
+                    <m:oMathParaPr>
+                      <m:jc m:val="centerGroup"/>
+                    </m:oMathParaPr>
+                    <m:oMath xmlns:m="http://schemas.openxmlformats.org/officeDocument/2006/math">
+                      <m:sSub>
+                        <m:sSubPr>
+                          <m:ctrlPr>
+                            <a:rPr lang="en-AU">
+                              <a:latin typeface="Cambria Math" panose="02040503050406030204" pitchFamily="18" charset="0"/>
+                            </a:rPr>
+                          </m:ctrlPr>
+                        </m:sSubPr>
+                        <m:e>
+                          <m:r>
+                            <a:rPr lang="en-AU" i="1">
+                              <a:latin typeface="Cambria Math" panose="02040503050406030204" pitchFamily="18" charset="0"/>
+                            </a:rPr>
+                            <m:t>𝑓</m:t>
+                          </m:r>
+                        </m:e>
+                        <m:sub>
+                          <m:r>
+                            <a:rPr lang="en-AU" i="1">
+                              <a:latin typeface="Cambria Math" panose="02040503050406030204" pitchFamily="18" charset="0"/>
+                            </a:rPr>
+                            <m:t>𝑂</m:t>
+                          </m:r>
+                        </m:sub>
+                      </m:sSub>
+                      <m:r>
+                        <a:rPr lang="en-AU" i="0">
+                          <a:latin typeface="Cambria Math" panose="02040503050406030204" pitchFamily="18" charset="0"/>
+                        </a:rPr>
+                        <m:t>= </m:t>
+                      </m:r>
+                      <m:sSub>
+                        <m:sSubPr>
+                          <m:ctrlPr>
+                            <a:rPr lang="en-AU" i="1">
+                              <a:latin typeface="Cambria Math" panose="02040503050406030204" pitchFamily="18" charset="0"/>
+                            </a:rPr>
+                          </m:ctrlPr>
+                        </m:sSubPr>
+                        <m:e>
+                          <m:r>
+                            <a:rPr lang="en-AU" i="1">
+                              <a:latin typeface="Cambria Math" panose="02040503050406030204" pitchFamily="18" charset="0"/>
+                            </a:rPr>
+                            <m:t>𝑓</m:t>
+                          </m:r>
+                        </m:e>
+                        <m:sub>
+                          <m:r>
+                            <a:rPr lang="en-AU" i="1">
+                              <a:latin typeface="Cambria Math" panose="02040503050406030204" pitchFamily="18" charset="0"/>
+                            </a:rPr>
+                            <m:t>𝐷</m:t>
+                          </m:r>
+                        </m:sub>
+                      </m:sSub>
+                      <m:r>
+                        <a:rPr lang="en-AU" i="0">
+                          <a:latin typeface="Cambria Math" panose="02040503050406030204" pitchFamily="18" charset="0"/>
+                        </a:rPr>
+                        <m:t>+ </m:t>
+                      </m:r>
+                      <m:f>
+                        <m:fPr>
+                          <m:ctrlPr>
+                            <a:rPr lang="en-AU" i="1">
+                              <a:latin typeface="Cambria Math" panose="02040503050406030204" pitchFamily="18" charset="0"/>
+                            </a:rPr>
+                          </m:ctrlPr>
+                        </m:fPr>
+                        <m:num>
+                          <m:d>
+                            <m:dPr>
+                              <m:begChr m:val=""/>
+                              <m:ctrlPr>
+                                <a:rPr lang="en-AU" i="1">
+                                  <a:latin typeface="Cambria Math" panose="02040503050406030204" pitchFamily="18" charset="0"/>
+                                </a:rPr>
+                              </m:ctrlPr>
+                            </m:dPr>
+                            <m:e>
+                              <m:r>
+                                <a:rPr lang="en-AU" i="1">
+                                  <a:latin typeface="Cambria Math" panose="02040503050406030204" pitchFamily="18" charset="0"/>
+                                </a:rPr>
+                                <m:t>𝑥</m:t>
+                              </m:r>
+                              <m:r>
+                                <a:rPr lang="en-AU" i="0">
+                                  <a:latin typeface="Cambria Math" panose="02040503050406030204" pitchFamily="18" charset="0"/>
+                                </a:rPr>
+                                <m:t> ∙(</m:t>
+                              </m:r>
+                              <m:sSub>
+                                <m:sSubPr>
+                                  <m:ctrlPr>
+                                    <a:rPr lang="en-AU" i="1">
+                                      <a:latin typeface="Cambria Math" panose="02040503050406030204" pitchFamily="18" charset="0"/>
+                                    </a:rPr>
+                                  </m:ctrlPr>
+                                </m:sSubPr>
+                                <m:e>
+                                  <m:r>
+                                    <a:rPr lang="en-AU" i="1">
+                                      <a:latin typeface="Cambria Math" panose="02040503050406030204" pitchFamily="18" charset="0"/>
+                                    </a:rPr>
+                                    <m:t>𝑓</m:t>
+                                  </m:r>
+                                </m:e>
+                                <m:sub>
+                                  <m:r>
+                                    <a:rPr lang="en-AU" i="1">
+                                      <a:latin typeface="Cambria Math" panose="02040503050406030204" pitchFamily="18" charset="0"/>
+                                    </a:rPr>
+                                    <m:t>𝑊</m:t>
+                                  </m:r>
+                                </m:sub>
+                              </m:sSub>
+                              <m:r>
+                                <a:rPr lang="en-AU" i="0">
+                                  <a:latin typeface="Cambria Math" panose="02040503050406030204" pitchFamily="18" charset="0"/>
+                                </a:rPr>
+                                <m:t>− </m:t>
+                              </m:r>
+                              <m:sSub>
+                                <m:sSubPr>
+                                  <m:ctrlPr>
+                                    <a:rPr lang="en-AU" i="1">
+                                      <a:latin typeface="Cambria Math" panose="02040503050406030204" pitchFamily="18" charset="0"/>
+                                    </a:rPr>
+                                  </m:ctrlPr>
+                                </m:sSubPr>
+                                <m:e>
+                                  <m:r>
+                                    <a:rPr lang="en-AU" i="1">
+                                      <a:latin typeface="Cambria Math" panose="02040503050406030204" pitchFamily="18" charset="0"/>
+                                    </a:rPr>
+                                    <m:t>𝑓</m:t>
+                                  </m:r>
+                                </m:e>
+                                <m:sub>
+                                  <m:r>
+                                    <a:rPr lang="en-AU" i="1">
+                                      <a:latin typeface="Cambria Math" panose="02040503050406030204" pitchFamily="18" charset="0"/>
+                                    </a:rPr>
+                                    <m:t>𝐷</m:t>
+                                  </m:r>
+                                </m:sub>
+                              </m:sSub>
+                            </m:e>
+                          </m:d>
+                        </m:num>
+                        <m:den>
+                          <m:r>
+                            <a:rPr lang="en-AU" i="0">
+                              <a:latin typeface="Cambria Math" panose="02040503050406030204" pitchFamily="18" charset="0"/>
+                            </a:rPr>
+                            <m:t>255</m:t>
+                          </m:r>
+                        </m:den>
+                      </m:f>
+                    </m:oMath>
+                  </m:oMathPara>
+                </a14:m>
+                <a:endParaRPr lang="en-AU" dirty="0"/>
+              </a:p>
+            </p:txBody>
+          </p:sp>
+        </mc:Choice>
+        <mc:Fallback>
+          <p:sp>
+            <p:nvSpPr>
+              <p:cNvPr id="3" name="Rectangle 2">
+                <a:extLst>
+                  <a:ext uri="{FF2B5EF4-FFF2-40B4-BE49-F238E27FC236}">
+                    <a16:creationId xmlns:a16="http://schemas.microsoft.com/office/drawing/2014/main" id="{54DF14C8-4B70-4E5C-8368-F0BEF2C15755}"/>
+                  </a:ext>
+                </a:extLst>
+              </p:cNvPr>
+              <p:cNvSpPr>
+                <a:spLocks noRot="1" noChangeAspect="1" noMove="1" noResize="1" noEditPoints="1" noAdjustHandles="1" noChangeArrowheads="1" noChangeShapeType="1" noTextEdit="1"/>
+              </p:cNvSpPr>
+              <p:nvPr/>
+            </p:nvSpPr>
+            <p:spPr>
+              <a:xfrm>
+                <a:off x="3246777" y="3871502"/>
+                <a:ext cx="2725040" cy="629916"/>
+              </a:xfrm>
+              <a:prstGeom prst="rect">
+                <a:avLst/>
+              </a:prstGeom>
+              <a:blipFill>
+                <a:blip r:embed="rId3"/>
+                <a:stretch>
+                  <a:fillRect/>
+                </a:stretch>
+              </a:blipFill>
+            </p:spPr>
+            <p:txBody>
+              <a:bodyPr/>
+              <a:lstStyle/>
+              <a:p>
+                <a:r>
+                  <a:rPr lang="en-AU">
+                    <a:noFill/>
+                  </a:rPr>
+                  <a:t> </a:t>
+                </a:r>
+              </a:p>
+            </p:txBody>
+          </p:sp>
+        </mc:Fallback>
+      </mc:AlternateContent>
+      <mc:AlternateContent xmlns:mc="http://schemas.openxmlformats.org/markup-compatibility/2006">
+        <mc:Choice xmlns:a14="http://schemas.microsoft.com/office/drawing/2010/main" Requires="a14">
+          <p:sp>
+            <p:nvSpPr>
+              <p:cNvPr id="7" name="Rectangle 6">
+                <a:extLst>
+                  <a:ext uri="{FF2B5EF4-FFF2-40B4-BE49-F238E27FC236}">
+                    <a16:creationId xmlns:a16="http://schemas.microsoft.com/office/drawing/2014/main" id="{022B9630-E129-41D0-9D5D-53314AB3EDAA}"/>
+                  </a:ext>
+                </a:extLst>
+              </p:cNvPr>
+              <p:cNvSpPr/>
+              <p:nvPr/>
+            </p:nvSpPr>
+            <p:spPr>
+              <a:xfrm>
+                <a:off x="3464432" y="4767935"/>
+                <a:ext cx="2289729" cy="678455"/>
+              </a:xfrm>
+              <a:prstGeom prst="rect">
+                <a:avLst/>
+              </a:prstGeom>
+            </p:spPr>
+            <p:txBody>
+              <a:bodyPr wrap="none">
+                <a:spAutoFit/>
+              </a:bodyPr>
+              <a:lstStyle/>
+              <a:p>
+                <a14:m>
+                  <m:oMathPara xmlns:m="http://schemas.openxmlformats.org/officeDocument/2006/math">
+                    <m:oMathParaPr>
+                      <m:jc m:val="centerGroup"/>
+                    </m:oMathParaPr>
+                    <m:oMath xmlns:m="http://schemas.openxmlformats.org/officeDocument/2006/math">
+                      <m:r>
+                        <a:rPr lang="en-AU" i="1">
+                          <a:latin typeface="Cambria Math" panose="02040503050406030204" pitchFamily="18" charset="0"/>
+                        </a:rPr>
+                        <m:t>𝑥</m:t>
+                      </m:r>
+                      <m:r>
+                        <a:rPr lang="en-AU" i="0">
+                          <a:latin typeface="Cambria Math" panose="02040503050406030204" pitchFamily="18" charset="0"/>
+                        </a:rPr>
+                        <m:t>= </m:t>
+                      </m:r>
+                      <m:f>
+                        <m:fPr>
+                          <m:ctrlPr>
+                            <a:rPr lang="en-AU" i="1">
+                              <a:latin typeface="Cambria Math" panose="02040503050406030204" pitchFamily="18" charset="0"/>
+                            </a:rPr>
+                          </m:ctrlPr>
+                        </m:fPr>
+                        <m:num>
+                          <m:d>
+                            <m:dPr>
+                              <m:begChr m:val=""/>
+                              <m:ctrlPr>
+                                <a:rPr lang="en-AU" i="1">
+                                  <a:latin typeface="Cambria Math" panose="02040503050406030204" pitchFamily="18" charset="0"/>
+                                </a:rPr>
+                              </m:ctrlPr>
+                            </m:dPr>
+                            <m:e>
+                              <m:r>
+                                <a:rPr lang="en-AU" i="0">
+                                  <a:latin typeface="Cambria Math" panose="02040503050406030204" pitchFamily="18" charset="0"/>
+                                </a:rPr>
+                                <m:t>255 ∙(</m:t>
+                              </m:r>
+                              <m:sSub>
+                                <m:sSubPr>
+                                  <m:ctrlPr>
+                                    <a:rPr lang="en-AU" i="1">
+                                      <a:latin typeface="Cambria Math" panose="02040503050406030204" pitchFamily="18" charset="0"/>
+                                    </a:rPr>
+                                  </m:ctrlPr>
+                                </m:sSubPr>
+                                <m:e>
+                                  <m:r>
+                                    <a:rPr lang="en-AU" i="1">
+                                      <a:latin typeface="Cambria Math" panose="02040503050406030204" pitchFamily="18" charset="0"/>
+                                    </a:rPr>
+                                    <m:t>𝑓</m:t>
+                                  </m:r>
+                                </m:e>
+                                <m:sub>
+                                  <m:r>
+                                    <a:rPr lang="en-AU" i="1">
+                                      <a:latin typeface="Cambria Math" panose="02040503050406030204" pitchFamily="18" charset="0"/>
+                                    </a:rPr>
+                                    <m:t>𝑂</m:t>
+                                  </m:r>
+                                </m:sub>
+                              </m:sSub>
+                              <m:r>
+                                <a:rPr lang="en-AU" i="0">
+                                  <a:latin typeface="Cambria Math" panose="02040503050406030204" pitchFamily="18" charset="0"/>
+                                </a:rPr>
+                                <m:t>− </m:t>
+                              </m:r>
+                              <m:sSub>
+                                <m:sSubPr>
+                                  <m:ctrlPr>
+                                    <a:rPr lang="en-AU" i="1">
+                                      <a:latin typeface="Cambria Math" panose="02040503050406030204" pitchFamily="18" charset="0"/>
+                                    </a:rPr>
+                                  </m:ctrlPr>
+                                </m:sSubPr>
+                                <m:e>
+                                  <m:r>
+                                    <a:rPr lang="en-AU" i="1">
+                                      <a:latin typeface="Cambria Math" panose="02040503050406030204" pitchFamily="18" charset="0"/>
+                                    </a:rPr>
+                                    <m:t>𝑓</m:t>
+                                  </m:r>
+                                </m:e>
+                                <m:sub>
+                                  <m:r>
+                                    <a:rPr lang="en-AU" i="1">
+                                      <a:latin typeface="Cambria Math" panose="02040503050406030204" pitchFamily="18" charset="0"/>
+                                    </a:rPr>
+                                    <m:t>𝐷</m:t>
+                                  </m:r>
+                                </m:sub>
+                              </m:sSub>
+                            </m:e>
+                          </m:d>
+                        </m:num>
+                        <m:den>
+                          <m:d>
+                            <m:dPr>
+                              <m:ctrlPr>
+                                <a:rPr lang="en-AU" i="1">
+                                  <a:latin typeface="Cambria Math" panose="02040503050406030204" pitchFamily="18" charset="0"/>
+                                </a:rPr>
+                              </m:ctrlPr>
+                            </m:dPr>
+                            <m:e>
+                              <m:sSub>
+                                <m:sSubPr>
+                                  <m:ctrlPr>
+                                    <a:rPr lang="en-AU" i="1">
+                                      <a:latin typeface="Cambria Math" panose="02040503050406030204" pitchFamily="18" charset="0"/>
+                                    </a:rPr>
+                                  </m:ctrlPr>
+                                </m:sSubPr>
+                                <m:e>
+                                  <m:r>
+                                    <a:rPr lang="en-AU" i="1">
+                                      <a:latin typeface="Cambria Math" panose="02040503050406030204" pitchFamily="18" charset="0"/>
+                                    </a:rPr>
+                                    <m:t>𝑓</m:t>
+                                  </m:r>
+                                </m:e>
+                                <m:sub>
+                                  <m:r>
+                                    <a:rPr lang="en-AU" i="1">
+                                      <a:latin typeface="Cambria Math" panose="02040503050406030204" pitchFamily="18" charset="0"/>
+                                    </a:rPr>
+                                    <m:t>𝑊</m:t>
+                                  </m:r>
+                                </m:sub>
+                              </m:sSub>
+                              <m:r>
+                                <a:rPr lang="en-AU" i="0">
+                                  <a:latin typeface="Cambria Math" panose="02040503050406030204" pitchFamily="18" charset="0"/>
+                                </a:rPr>
+                                <m:t>− </m:t>
+                              </m:r>
+                              <m:sSub>
+                                <m:sSubPr>
+                                  <m:ctrlPr>
+                                    <a:rPr lang="en-AU" i="1">
+                                      <a:latin typeface="Cambria Math" panose="02040503050406030204" pitchFamily="18" charset="0"/>
+                                    </a:rPr>
+                                  </m:ctrlPr>
+                                </m:sSubPr>
+                                <m:e>
+                                  <m:r>
+                                    <a:rPr lang="en-AU" i="1">
+                                      <a:latin typeface="Cambria Math" panose="02040503050406030204" pitchFamily="18" charset="0"/>
+                                    </a:rPr>
+                                    <m:t>𝑓</m:t>
+                                  </m:r>
+                                </m:e>
+                                <m:sub>
+                                  <m:r>
+                                    <a:rPr lang="en-AU" i="1">
+                                      <a:latin typeface="Cambria Math" panose="02040503050406030204" pitchFamily="18" charset="0"/>
+                                    </a:rPr>
+                                    <m:t>𝐷</m:t>
+                                  </m:r>
+                                </m:sub>
+                              </m:sSub>
+                            </m:e>
+                          </m:d>
+                        </m:den>
+                      </m:f>
+                    </m:oMath>
+                  </m:oMathPara>
+                </a14:m>
+                <a:endParaRPr lang="en-AU" dirty="0"/>
+              </a:p>
+            </p:txBody>
+          </p:sp>
+        </mc:Choice>
+        <mc:Fallback>
+          <p:sp>
+            <p:nvSpPr>
+              <p:cNvPr id="7" name="Rectangle 6">
+                <a:extLst>
+                  <a:ext uri="{FF2B5EF4-FFF2-40B4-BE49-F238E27FC236}">
+                    <a16:creationId xmlns:a16="http://schemas.microsoft.com/office/drawing/2014/main" id="{022B9630-E129-41D0-9D5D-53314AB3EDAA}"/>
+                  </a:ext>
+                </a:extLst>
+              </p:cNvPr>
+              <p:cNvSpPr>
+                <a:spLocks noRot="1" noChangeAspect="1" noMove="1" noResize="1" noEditPoints="1" noAdjustHandles="1" noChangeArrowheads="1" noChangeShapeType="1" noTextEdit="1"/>
+              </p:cNvSpPr>
+              <p:nvPr/>
+            </p:nvSpPr>
+            <p:spPr>
+              <a:xfrm>
+                <a:off x="3464432" y="4767935"/>
+                <a:ext cx="2289729" cy="678455"/>
+              </a:xfrm>
+              <a:prstGeom prst="rect">
+                <a:avLst/>
+              </a:prstGeom>
+              <a:blipFill>
+                <a:blip r:embed="rId4"/>
+                <a:stretch>
+                  <a:fillRect/>
+                </a:stretch>
+              </a:blipFill>
+            </p:spPr>
+            <p:txBody>
+              <a:bodyPr/>
+              <a:lstStyle/>
+              <a:p>
+                <a:r>
+                  <a:rPr lang="en-AU">
+                    <a:noFill/>
+                  </a:rPr>
+                  <a:t> </a:t>
+                </a:r>
+              </a:p>
+            </p:txBody>
+          </p:sp>
+        </mc:Fallback>
+      </mc:AlternateContent>
     </p:spTree>
     <p:extLst>
       <p:ext uri="{BB962C8B-B14F-4D97-AF65-F5344CB8AC3E}">

</xml_diff>

<commit_message>
Fixed on compliant fiel name. Added templates for pull and issues.
</commit_message>
<xml_diff>
--- a/media/figure/TCS230 Functional Diagrams.pptx
+++ b/media/figure/TCS230 Functional Diagrams.pptx
@@ -304,7 +304,7 @@
           <a:p>
             <a:fld id="{23EE98EC-434B-4485-8071-B72996E1CC3F}" type="datetimeFigureOut">
               <a:rPr lang="en-AU" smtClean="0"/>
-              <a:t>15/02/2018</a:t>
+              <a:t>11/08/2018</a:t>
             </a:fld>
             <a:endParaRPr lang="en-AU"/>
           </a:p>
@@ -474,7 +474,7 @@
           <a:p>
             <a:fld id="{23EE98EC-434B-4485-8071-B72996E1CC3F}" type="datetimeFigureOut">
               <a:rPr lang="en-AU" smtClean="0"/>
-              <a:t>15/02/2018</a:t>
+              <a:t>11/08/2018</a:t>
             </a:fld>
             <a:endParaRPr lang="en-AU"/>
           </a:p>
@@ -654,7 +654,7 @@
           <a:p>
             <a:fld id="{23EE98EC-434B-4485-8071-B72996E1CC3F}" type="datetimeFigureOut">
               <a:rPr lang="en-AU" smtClean="0"/>
-              <a:t>15/02/2018</a:t>
+              <a:t>11/08/2018</a:t>
             </a:fld>
             <a:endParaRPr lang="en-AU"/>
           </a:p>
@@ -824,7 +824,7 @@
           <a:p>
             <a:fld id="{23EE98EC-434B-4485-8071-B72996E1CC3F}" type="datetimeFigureOut">
               <a:rPr lang="en-AU" smtClean="0"/>
-              <a:t>15/02/2018</a:t>
+              <a:t>11/08/2018</a:t>
             </a:fld>
             <a:endParaRPr lang="en-AU"/>
           </a:p>
@@ -1070,7 +1070,7 @@
           <a:p>
             <a:fld id="{23EE98EC-434B-4485-8071-B72996E1CC3F}" type="datetimeFigureOut">
               <a:rPr lang="en-AU" smtClean="0"/>
-              <a:t>15/02/2018</a:t>
+              <a:t>11/08/2018</a:t>
             </a:fld>
             <a:endParaRPr lang="en-AU"/>
           </a:p>
@@ -1358,7 +1358,7 @@
           <a:p>
             <a:fld id="{23EE98EC-434B-4485-8071-B72996E1CC3F}" type="datetimeFigureOut">
               <a:rPr lang="en-AU" smtClean="0"/>
-              <a:t>15/02/2018</a:t>
+              <a:t>11/08/2018</a:t>
             </a:fld>
             <a:endParaRPr lang="en-AU"/>
           </a:p>
@@ -1780,7 +1780,7 @@
           <a:p>
             <a:fld id="{23EE98EC-434B-4485-8071-B72996E1CC3F}" type="datetimeFigureOut">
               <a:rPr lang="en-AU" smtClean="0"/>
-              <a:t>15/02/2018</a:t>
+              <a:t>11/08/2018</a:t>
             </a:fld>
             <a:endParaRPr lang="en-AU"/>
           </a:p>
@@ -1898,7 +1898,7 @@
           <a:p>
             <a:fld id="{23EE98EC-434B-4485-8071-B72996E1CC3F}" type="datetimeFigureOut">
               <a:rPr lang="en-AU" smtClean="0"/>
-              <a:t>15/02/2018</a:t>
+              <a:t>11/08/2018</a:t>
             </a:fld>
             <a:endParaRPr lang="en-AU"/>
           </a:p>
@@ -1993,7 +1993,7 @@
           <a:p>
             <a:fld id="{23EE98EC-434B-4485-8071-B72996E1CC3F}" type="datetimeFigureOut">
               <a:rPr lang="en-AU" smtClean="0"/>
-              <a:t>15/02/2018</a:t>
+              <a:t>11/08/2018</a:t>
             </a:fld>
             <a:endParaRPr lang="en-AU"/>
           </a:p>
@@ -2270,7 +2270,7 @@
           <a:p>
             <a:fld id="{23EE98EC-434B-4485-8071-B72996E1CC3F}" type="datetimeFigureOut">
               <a:rPr lang="en-AU" smtClean="0"/>
-              <a:t>15/02/2018</a:t>
+              <a:t>11/08/2018</a:t>
             </a:fld>
             <a:endParaRPr lang="en-AU"/>
           </a:p>
@@ -2523,7 +2523,7 @@
           <a:p>
             <a:fld id="{23EE98EC-434B-4485-8071-B72996E1CC3F}" type="datetimeFigureOut">
               <a:rPr lang="en-AU" smtClean="0"/>
-              <a:t>15/02/2018</a:t>
+              <a:t>11/08/2018</a:t>
             </a:fld>
             <a:endParaRPr lang="en-AU"/>
           </a:p>
@@ -2736,7 +2736,7 @@
           <a:p>
             <a:fld id="{23EE98EC-434B-4485-8071-B72996E1CC3F}" type="datetimeFigureOut">
               <a:rPr lang="en-AU" smtClean="0"/>
-              <a:t>15/02/2018</a:t>
+              <a:t>11/08/2018</a:t>
             </a:fld>
             <a:endParaRPr lang="en-AU"/>
           </a:p>
@@ -3113,7 +3113,13 @@
       </p:grpSpPr>
       <p:grpSp>
         <p:nvGrpSpPr>
-          <p:cNvPr id="54" name="Group 53"/>
+          <p:cNvPr id="9" name="Group 8">
+            <a:extLst>
+              <a:ext uri="{FF2B5EF4-FFF2-40B4-BE49-F238E27FC236}">
+                <a16:creationId xmlns:a16="http://schemas.microsoft.com/office/drawing/2014/main" id="{0A088363-1ACD-4211-A7BC-F15E52F7CF81}"/>
+              </a:ext>
+            </a:extLst>
+          </p:cNvPr>
           <p:cNvGrpSpPr/>
           <p:nvPr/>
         </p:nvGrpSpPr>
@@ -3121,7 +3127,7 @@
           <a:xfrm>
             <a:off x="1547664" y="764704"/>
             <a:ext cx="5155912" cy="1675349"/>
-            <a:chOff x="1180699" y="2081753"/>
+            <a:chOff x="1547664" y="764704"/>
             <a:chExt cx="5155912" cy="1675349"/>
           </a:xfrm>
         </p:grpSpPr>
@@ -3133,7 +3139,7 @@
           </p:nvSpPr>
           <p:spPr>
             <a:xfrm>
-              <a:off x="2195736" y="2204864"/>
+              <a:off x="2562701" y="887815"/>
               <a:ext cx="1368152" cy="720080"/>
             </a:xfrm>
             <a:prstGeom prst="rect">
@@ -3186,7 +3192,7 @@
           </p:nvSpPr>
           <p:spPr>
             <a:xfrm>
-              <a:off x="3851920" y="2204864"/>
+              <a:off x="4218885" y="887815"/>
               <a:ext cx="1368152" cy="720080"/>
             </a:xfrm>
             <a:prstGeom prst="rect">
@@ -3239,8 +3245,8 @@
           </p:nvSpPr>
           <p:spPr>
             <a:xfrm>
-              <a:off x="2123728" y="2132856"/>
-              <a:ext cx="3168352" cy="864096"/>
+              <a:off x="2435384" y="764704"/>
+              <a:ext cx="3259251" cy="955453"/>
             </a:xfrm>
             <a:prstGeom prst="rect">
               <a:avLst/>
@@ -3289,7 +3295,7 @@
           </p:nvCxnSpPr>
           <p:spPr>
             <a:xfrm>
-              <a:off x="3563888" y="2564904"/>
+              <a:off x="3930853" y="1247855"/>
               <a:ext cx="288032" cy="0"/>
             </a:xfrm>
             <a:prstGeom prst="line">
@@ -3324,7 +3330,7 @@
           </p:nvCxnSpPr>
           <p:spPr>
             <a:xfrm>
-              <a:off x="1547664" y="2420888"/>
+              <a:off x="1914629" y="1103839"/>
               <a:ext cx="457200" cy="0"/>
             </a:xfrm>
             <a:prstGeom prst="straightConnector1">
@@ -3360,7 +3366,7 @@
           </p:nvCxnSpPr>
           <p:spPr>
             <a:xfrm>
-              <a:off x="1547664" y="2708920"/>
+              <a:off x="1914629" y="1391871"/>
               <a:ext cx="457200" cy="0"/>
             </a:xfrm>
             <a:prstGeom prst="straightConnector1">
@@ -3396,7 +3402,7 @@
           </p:nvSpPr>
           <p:spPr>
             <a:xfrm>
-              <a:off x="1180699" y="2420888"/>
+              <a:off x="1547664" y="1103839"/>
               <a:ext cx="576064" cy="246221"/>
             </a:xfrm>
             <a:prstGeom prst="rect">
@@ -3425,7 +3431,7 @@
           </p:nvSpPr>
           <p:spPr>
             <a:xfrm>
-              <a:off x="2483768" y="3356992"/>
+              <a:off x="2850733" y="2039943"/>
               <a:ext cx="792088" cy="400110"/>
             </a:xfrm>
             <a:prstGeom prst="rect">
@@ -3459,7 +3465,7 @@
           </p:nvSpPr>
           <p:spPr>
             <a:xfrm>
-              <a:off x="3851920" y="3356992"/>
+              <a:off x="4218885" y="2039943"/>
               <a:ext cx="1367271" cy="400110"/>
             </a:xfrm>
             <a:prstGeom prst="rect">
@@ -3489,7 +3495,7 @@
           </p:nvCxnSpPr>
           <p:spPr>
             <a:xfrm>
-              <a:off x="2699792" y="2924944"/>
+              <a:off x="3066757" y="1607895"/>
               <a:ext cx="0" cy="288032"/>
             </a:xfrm>
             <a:prstGeom prst="line">
@@ -3499,6 +3505,8 @@
               <a:solidFill>
                 <a:schemeClr val="tx1"/>
               </a:solidFill>
+              <a:headEnd type="triangle"/>
+              <a:tailEnd type="none"/>
             </a:ln>
           </p:spPr>
           <p:style>
@@ -3524,7 +3532,7 @@
           </p:nvCxnSpPr>
           <p:spPr>
             <a:xfrm>
-              <a:off x="3059832" y="2924944"/>
+              <a:off x="3426797" y="1607895"/>
               <a:ext cx="0" cy="288032"/>
             </a:xfrm>
             <a:prstGeom prst="line">
@@ -3534,6 +3542,7 @@
               <a:solidFill>
                 <a:schemeClr val="tx1"/>
               </a:solidFill>
+              <a:headEnd type="triangle"/>
             </a:ln>
           </p:spPr>
           <p:style>
@@ -3559,7 +3568,7 @@
           </p:nvCxnSpPr>
           <p:spPr>
             <a:xfrm>
-              <a:off x="4355976" y="2924944"/>
+              <a:off x="4722941" y="1607895"/>
               <a:ext cx="0" cy="288032"/>
             </a:xfrm>
             <a:prstGeom prst="line">
@@ -3569,6 +3578,7 @@
               <a:solidFill>
                 <a:schemeClr val="tx1"/>
               </a:solidFill>
+              <a:headEnd type="triangle"/>
             </a:ln>
           </p:spPr>
           <p:style>
@@ -3594,7 +3604,7 @@
           </p:nvCxnSpPr>
           <p:spPr>
             <a:xfrm>
-              <a:off x="4716016" y="2924944"/>
+              <a:off x="5082981" y="1607895"/>
               <a:ext cx="0" cy="288032"/>
             </a:xfrm>
             <a:prstGeom prst="line">
@@ -3604,6 +3614,7 @@
               <a:solidFill>
                 <a:schemeClr val="tx1"/>
               </a:solidFill>
+              <a:headEnd type="triangle"/>
             </a:ln>
           </p:spPr>
           <p:style>
@@ -3629,7 +3640,7 @@
           </p:nvSpPr>
           <p:spPr>
             <a:xfrm>
-              <a:off x="2519771" y="3223429"/>
+              <a:off x="2886736" y="1906380"/>
               <a:ext cx="360041" cy="246221"/>
             </a:xfrm>
             <a:prstGeom prst="rect">
@@ -3659,7 +3670,7 @@
           </p:nvSpPr>
           <p:spPr>
             <a:xfrm>
-              <a:off x="2880000" y="3223429"/>
+              <a:off x="3246965" y="1906380"/>
               <a:ext cx="360041" cy="246221"/>
             </a:xfrm>
             <a:prstGeom prst="rect">
@@ -3689,7 +3700,7 @@
           </p:nvSpPr>
           <p:spPr>
             <a:xfrm>
-              <a:off x="4176000" y="3212976"/>
+              <a:off x="4542965" y="1895927"/>
               <a:ext cx="360041" cy="246221"/>
             </a:xfrm>
             <a:prstGeom prst="rect">
@@ -3719,7 +3730,7 @@
           </p:nvSpPr>
           <p:spPr>
             <a:xfrm>
-              <a:off x="4536000" y="3212976"/>
+              <a:off x="4902965" y="1895927"/>
               <a:ext cx="360041" cy="246221"/>
             </a:xfrm>
             <a:prstGeom prst="rect">
@@ -3749,7 +3760,7 @@
           </p:nvCxnSpPr>
           <p:spPr>
             <a:xfrm>
-              <a:off x="5220072" y="2348880"/>
+              <a:off x="5587037" y="1031831"/>
               <a:ext cx="360040" cy="0"/>
             </a:xfrm>
             <a:prstGeom prst="line">
@@ -3759,6 +3770,7 @@
               <a:solidFill>
                 <a:schemeClr val="tx1"/>
               </a:solidFill>
+              <a:tailEnd type="triangle"/>
             </a:ln>
           </p:spPr>
           <p:style>
@@ -3784,7 +3796,7 @@
           </p:nvCxnSpPr>
           <p:spPr>
             <a:xfrm>
-              <a:off x="5220072" y="2780928"/>
+              <a:off x="5587037" y="1463879"/>
               <a:ext cx="360040" cy="0"/>
             </a:xfrm>
             <a:prstGeom prst="line">
@@ -3794,6 +3806,7 @@
               <a:solidFill>
                 <a:schemeClr val="tx1"/>
               </a:solidFill>
+              <a:headEnd type="triangle"/>
             </a:ln>
           </p:spPr>
           <p:style>
@@ -3819,7 +3832,7 @@
           </p:nvCxnSpPr>
           <p:spPr>
             <a:xfrm>
-              <a:off x="5580112" y="2780928"/>
+              <a:off x="5947077" y="1463879"/>
               <a:ext cx="0" cy="288032"/>
             </a:xfrm>
             <a:prstGeom prst="line">
@@ -3854,7 +3867,7 @@
           </p:nvSpPr>
           <p:spPr>
             <a:xfrm>
-              <a:off x="5400000" y="3140968"/>
+              <a:off x="5766965" y="1823919"/>
               <a:ext cx="360041" cy="246221"/>
             </a:xfrm>
             <a:prstGeom prst="rect">
@@ -3884,7 +3897,7 @@
           </p:nvCxnSpPr>
           <p:spPr>
             <a:xfrm>
-              <a:off x="5544199" y="3168000"/>
+              <a:off x="5911164" y="1850951"/>
               <a:ext cx="72000" cy="0"/>
             </a:xfrm>
             <a:prstGeom prst="line">
@@ -3919,7 +3932,7 @@
           </p:nvSpPr>
           <p:spPr>
             <a:xfrm>
-              <a:off x="5328167" y="2081753"/>
+              <a:off x="5695132" y="764704"/>
               <a:ext cx="576064" cy="246221"/>
             </a:xfrm>
             <a:prstGeom prst="rect">
@@ -3948,7 +3961,7 @@
           </p:nvCxnSpPr>
           <p:spPr>
             <a:xfrm>
-              <a:off x="5796136" y="2420888"/>
+              <a:off x="6163101" y="1103839"/>
               <a:ext cx="108095" cy="0"/>
             </a:xfrm>
             <a:prstGeom prst="line">
@@ -3983,7 +3996,7 @@
           </p:nvCxnSpPr>
           <p:spPr>
             <a:xfrm>
-              <a:off x="5904231" y="2276872"/>
+              <a:off x="6271196" y="959823"/>
               <a:ext cx="108095" cy="0"/>
             </a:xfrm>
             <a:prstGeom prst="line">
@@ -4018,7 +4031,7 @@
           </p:nvCxnSpPr>
           <p:spPr>
             <a:xfrm>
-              <a:off x="6012326" y="2420888"/>
+              <a:off x="6379291" y="1103839"/>
               <a:ext cx="108095" cy="0"/>
             </a:xfrm>
             <a:prstGeom prst="line">
@@ -4053,7 +4066,7 @@
           </p:nvCxnSpPr>
           <p:spPr>
             <a:xfrm>
-              <a:off x="6120421" y="2276872"/>
+              <a:off x="6487386" y="959823"/>
               <a:ext cx="108095" cy="0"/>
             </a:xfrm>
             <a:prstGeom prst="line">
@@ -4088,7 +4101,7 @@
           </p:nvCxnSpPr>
           <p:spPr>
             <a:xfrm>
-              <a:off x="6228516" y="2420888"/>
+              <a:off x="6595481" y="1103839"/>
               <a:ext cx="108095" cy="0"/>
             </a:xfrm>
             <a:prstGeom prst="line">
@@ -4123,7 +4136,7 @@
           </p:nvCxnSpPr>
           <p:spPr>
             <a:xfrm flipV="1">
-              <a:off x="5904231" y="2276872"/>
+              <a:off x="6271196" y="959823"/>
               <a:ext cx="1" cy="148208"/>
             </a:xfrm>
             <a:prstGeom prst="line">
@@ -4158,7 +4171,7 @@
           </p:nvCxnSpPr>
           <p:spPr>
             <a:xfrm flipV="1">
-              <a:off x="6012160" y="2274776"/>
+              <a:off x="6379125" y="957727"/>
               <a:ext cx="1" cy="148208"/>
             </a:xfrm>
             <a:prstGeom prst="line">
@@ -4193,7 +4206,7 @@
           </p:nvCxnSpPr>
           <p:spPr>
             <a:xfrm flipV="1">
-              <a:off x="6120089" y="2272680"/>
+              <a:off x="6487054" y="955631"/>
               <a:ext cx="1" cy="148208"/>
             </a:xfrm>
             <a:prstGeom prst="line">
@@ -4228,7 +4241,7 @@
           </p:nvCxnSpPr>
           <p:spPr>
             <a:xfrm flipV="1">
-              <a:off x="6228018" y="2270584"/>
+              <a:off x="6594983" y="953535"/>
               <a:ext cx="1" cy="148208"/>
             </a:xfrm>
             <a:prstGeom prst="line">
@@ -4256,8 +4269,8 @@
           </p:style>
         </p:cxnSp>
       </p:grpSp>
-      <mc:AlternateContent xmlns:mc="http://schemas.openxmlformats.org/markup-compatibility/2006">
-        <mc:Choice xmlns:a14="http://schemas.microsoft.com/office/drawing/2010/main" Requires="a14">
+      <mc:AlternateContent xmlns:mc="http://schemas.openxmlformats.org/markup-compatibility/2006" xmlns:a14="http://schemas.microsoft.com/office/drawing/2010/main">
+        <mc:Choice Requires="a14">
           <p:sp>
             <p:nvSpPr>
               <p:cNvPr id="2" name="Rectangle 1">
@@ -4285,6 +4298,7 @@
               </a:bodyPr>
               <a:lstStyle/>
               <a:p>
+                <a:pPr/>
                 <a14:m>
                   <m:oMathPara xmlns:m="http://schemas.openxmlformats.org/officeDocument/2006/math">
                     <m:oMathParaPr>
@@ -4295,7 +4309,7 @@
                         <m:dPr>
                           <m:begChr m:val=""/>
                           <m:ctrlPr>
-                            <a:rPr lang="en-AU">
+                            <a:rPr lang="en-AU" i="1">
                               <a:latin typeface="Cambria Math" panose="02040503050406030204" pitchFamily="18" charset="0"/>
                             </a:rPr>
                           </m:ctrlPr>
@@ -4304,7 +4318,7 @@
                           <m:sSub>
                             <m:sSubPr>
                               <m:ctrlPr>
-                                <a:rPr lang="en-AU">
+                                <a:rPr lang="en-AU" i="1">
                                   <a:latin typeface="Cambria Math" panose="02040503050406030204" pitchFamily="18" charset="0"/>
                                 </a:rPr>
                               </m:ctrlPr>
@@ -4391,7 +4405,7 @@
             </p:txBody>
           </p:sp>
         </mc:Choice>
-        <mc:Fallback>
+        <mc:Fallback xmlns="">
           <p:sp>
             <p:nvSpPr>
               <p:cNvPr id="2" name="Rectangle 1">
@@ -4436,8 +4450,8 @@
           </p:sp>
         </mc:Fallback>
       </mc:AlternateContent>
-      <mc:AlternateContent xmlns:mc="http://schemas.openxmlformats.org/markup-compatibility/2006">
-        <mc:Choice xmlns:a14="http://schemas.microsoft.com/office/drawing/2010/main" Requires="a14">
+      <mc:AlternateContent xmlns:mc="http://schemas.openxmlformats.org/markup-compatibility/2006" xmlns:a14="http://schemas.microsoft.com/office/drawing/2010/main">
+        <mc:Choice Requires="a14">
           <p:sp>
             <p:nvSpPr>
               <p:cNvPr id="3" name="Rectangle 2">
@@ -4465,6 +4479,7 @@
               </a:bodyPr>
               <a:lstStyle/>
               <a:p>
+                <a:pPr/>
                 <a14:m>
                   <m:oMathPara xmlns:m="http://schemas.openxmlformats.org/officeDocument/2006/math">
                     <m:oMathParaPr>
@@ -4474,7 +4489,7 @@
                       <m:sSub>
                         <m:sSubPr>
                           <m:ctrlPr>
-                            <a:rPr lang="en-AU">
+                            <a:rPr lang="en-AU" i="1">
                               <a:latin typeface="Cambria Math" panose="02040503050406030204" pitchFamily="18" charset="0"/>
                             </a:rPr>
                           </m:ctrlPr>
@@ -4640,7 +4655,7 @@
             </p:txBody>
           </p:sp>
         </mc:Choice>
-        <mc:Fallback>
+        <mc:Fallback xmlns="">
           <p:sp>
             <p:nvSpPr>
               <p:cNvPr id="3" name="Rectangle 2">
@@ -4685,8 +4700,8 @@
           </p:sp>
         </mc:Fallback>
       </mc:AlternateContent>
-      <mc:AlternateContent xmlns:mc="http://schemas.openxmlformats.org/markup-compatibility/2006">
-        <mc:Choice xmlns:a14="http://schemas.microsoft.com/office/drawing/2010/main" Requires="a14">
+      <mc:AlternateContent xmlns:mc="http://schemas.openxmlformats.org/markup-compatibility/2006" xmlns:a14="http://schemas.microsoft.com/office/drawing/2010/main">
+        <mc:Choice Requires="a14">
           <p:sp>
             <p:nvSpPr>
               <p:cNvPr id="7" name="Rectangle 6">
@@ -4714,6 +4729,7 @@
               </a:bodyPr>
               <a:lstStyle/>
               <a:p>
+                <a:pPr/>
                 <a14:m>
                   <m:oMathPara xmlns:m="http://schemas.openxmlformats.org/officeDocument/2006/math">
                     <m:oMathParaPr>
@@ -4894,7 +4910,7 @@
             </p:txBody>
           </p:sp>
         </mc:Choice>
-        <mc:Fallback>
+        <mc:Fallback xmlns="">
           <p:sp>
             <p:nvSpPr>
               <p:cNvPr id="7" name="Rectangle 6">

</xml_diff>